<commit_message>
Update the Document Compte rendu
</commit_message>
<xml_diff>
--- a/CRReunions.pptx
+++ b/CRReunions.pptx
@@ -9,12 +9,13 @@
     <p:sldId id="266" r:id="rId3"/>
     <p:sldId id="257" r:id="rId4"/>
     <p:sldId id="258" r:id="rId5"/>
-    <p:sldId id="265" r:id="rId6"/>
-    <p:sldId id="262" r:id="rId7"/>
-    <p:sldId id="263" r:id="rId8"/>
-    <p:sldId id="264" r:id="rId9"/>
-    <p:sldId id="261" r:id="rId10"/>
-    <p:sldId id="259" r:id="rId11"/>
+    <p:sldId id="267" r:id="rId6"/>
+    <p:sldId id="265" r:id="rId7"/>
+    <p:sldId id="262" r:id="rId8"/>
+    <p:sldId id="263" r:id="rId9"/>
+    <p:sldId id="264" r:id="rId10"/>
+    <p:sldId id="261" r:id="rId11"/>
+    <p:sldId id="259" r:id="rId12"/>
   </p:sldIdLst>
   <p:sldSz cx="12192000" cy="6858000"/>
   <p:notesSz cx="6858000" cy="9144000"/>
@@ -113,6 +114,11 @@
       </a:defRPr>
     </a:lvl9pPr>
   </p:defaultTextStyle>
+  <p:extLst>
+    <p:ext uri="{EFAFB233-063F-42B5-8137-9DF3F51BA10A}">
+      <p15:sldGuideLst xmlns:p15="http://schemas.microsoft.com/office/powerpoint/2012/main"/>
+    </p:ext>
+  </p:extLst>
 </p:presentation>
 </file>
 
@@ -247,7 +253,7 @@
           <a:p>
             <a:fld id="{A126CE8B-7A42-45D2-9264-8FB20555E970}" type="datetimeFigureOut">
               <a:rPr lang="en-GB" smtClean="0"/>
-              <a:t>16/11/2017</a:t>
+              <a:t>24/11/2017</a:t>
             </a:fld>
             <a:endParaRPr lang="en-GB"/>
           </a:p>
@@ -417,7 +423,7 @@
           <a:p>
             <a:fld id="{A126CE8B-7A42-45D2-9264-8FB20555E970}" type="datetimeFigureOut">
               <a:rPr lang="en-GB" smtClean="0"/>
-              <a:t>16/11/2017</a:t>
+              <a:t>24/11/2017</a:t>
             </a:fld>
             <a:endParaRPr lang="en-GB"/>
           </a:p>
@@ -597,7 +603,7 @@
           <a:p>
             <a:fld id="{A126CE8B-7A42-45D2-9264-8FB20555E970}" type="datetimeFigureOut">
               <a:rPr lang="en-GB" smtClean="0"/>
-              <a:t>16/11/2017</a:t>
+              <a:t>24/11/2017</a:t>
             </a:fld>
             <a:endParaRPr lang="en-GB"/>
           </a:p>
@@ -767,7 +773,7 @@
           <a:p>
             <a:fld id="{A126CE8B-7A42-45D2-9264-8FB20555E970}" type="datetimeFigureOut">
               <a:rPr lang="en-GB" smtClean="0"/>
-              <a:t>16/11/2017</a:t>
+              <a:t>24/11/2017</a:t>
             </a:fld>
             <a:endParaRPr lang="en-GB"/>
           </a:p>
@@ -1013,7 +1019,7 @@
           <a:p>
             <a:fld id="{A126CE8B-7A42-45D2-9264-8FB20555E970}" type="datetimeFigureOut">
               <a:rPr lang="en-GB" smtClean="0"/>
-              <a:t>16/11/2017</a:t>
+              <a:t>24/11/2017</a:t>
             </a:fld>
             <a:endParaRPr lang="en-GB"/>
           </a:p>
@@ -1245,7 +1251,7 @@
           <a:p>
             <a:fld id="{A126CE8B-7A42-45D2-9264-8FB20555E970}" type="datetimeFigureOut">
               <a:rPr lang="en-GB" smtClean="0"/>
-              <a:t>16/11/2017</a:t>
+              <a:t>24/11/2017</a:t>
             </a:fld>
             <a:endParaRPr lang="en-GB"/>
           </a:p>
@@ -1612,7 +1618,7 @@
           <a:p>
             <a:fld id="{A126CE8B-7A42-45D2-9264-8FB20555E970}" type="datetimeFigureOut">
               <a:rPr lang="en-GB" smtClean="0"/>
-              <a:t>16/11/2017</a:t>
+              <a:t>24/11/2017</a:t>
             </a:fld>
             <a:endParaRPr lang="en-GB"/>
           </a:p>
@@ -1730,7 +1736,7 @@
           <a:p>
             <a:fld id="{A126CE8B-7A42-45D2-9264-8FB20555E970}" type="datetimeFigureOut">
               <a:rPr lang="en-GB" smtClean="0"/>
-              <a:t>16/11/2017</a:t>
+              <a:t>24/11/2017</a:t>
             </a:fld>
             <a:endParaRPr lang="en-GB"/>
           </a:p>
@@ -1825,7 +1831,7 @@
           <a:p>
             <a:fld id="{A126CE8B-7A42-45D2-9264-8FB20555E970}" type="datetimeFigureOut">
               <a:rPr lang="en-GB" smtClean="0"/>
-              <a:t>16/11/2017</a:t>
+              <a:t>24/11/2017</a:t>
             </a:fld>
             <a:endParaRPr lang="en-GB"/>
           </a:p>
@@ -2102,7 +2108,7 @@
           <a:p>
             <a:fld id="{A126CE8B-7A42-45D2-9264-8FB20555E970}" type="datetimeFigureOut">
               <a:rPr lang="en-GB" smtClean="0"/>
-              <a:t>16/11/2017</a:t>
+              <a:t>24/11/2017</a:t>
             </a:fld>
             <a:endParaRPr lang="en-GB"/>
           </a:p>
@@ -2355,7 +2361,7 @@
           <a:p>
             <a:fld id="{A126CE8B-7A42-45D2-9264-8FB20555E970}" type="datetimeFigureOut">
               <a:rPr lang="en-GB" smtClean="0"/>
-              <a:t>16/11/2017</a:t>
+              <a:t>24/11/2017</a:t>
             </a:fld>
             <a:endParaRPr lang="en-GB"/>
           </a:p>
@@ -2568,7 +2574,7 @@
           <a:p>
             <a:fld id="{A126CE8B-7A42-45D2-9264-8FB20555E970}" type="datetimeFigureOut">
               <a:rPr lang="en-GB" smtClean="0"/>
-              <a:t>16/11/2017</a:t>
+              <a:t>24/11/2017</a:t>
             </a:fld>
             <a:endParaRPr lang="en-GB"/>
           </a:p>
@@ -3029,6 +3035,13 @@
   <p:clrMapOvr>
     <a:masterClrMapping/>
   </p:clrMapOvr>
+  <p:timing>
+    <p:tnLst>
+      <p:par>
+        <p:cTn id="1" dur="indefinite" restart="never" nodeType="tmRoot"/>
+      </p:par>
+    </p:tnLst>
+  </p:timing>
 </p:sld>
 </file>
 
@@ -3065,6 +3078,268 @@
           <a:lstStyle/>
           <a:p>
             <a:r>
+              <a:rPr lang="fr-FR" dirty="0" err="1" smtClean="0"/>
+              <a:t>main.c</a:t>
+            </a:r>
+            <a:endParaRPr lang="en-US" dirty="0"/>
+          </a:p>
+        </p:txBody>
+      </p:sp>
+      <p:sp>
+        <p:nvSpPr>
+          <p:cNvPr id="3" name="Espace réservé du contenu 2"/>
+          <p:cNvSpPr>
+            <a:spLocks noGrp="1"/>
+          </p:cNvSpPr>
+          <p:nvPr>
+            <p:ph idx="1"/>
+          </p:nvPr>
+        </p:nvSpPr>
+        <p:spPr/>
+        <p:txBody>
+          <a:bodyPr>
+            <a:normAutofit fontScale="92500" lnSpcReduction="10000"/>
+          </a:bodyPr>
+          <a:lstStyle/>
+          <a:p>
+            <a:r>
+              <a:rPr lang="fr-FR" dirty="0" smtClean="0"/>
+              <a:t>Détecter l’obstacle </a:t>
+            </a:r>
+          </a:p>
+          <a:p>
+            <a:pPr lvl="1"/>
+            <a:r>
+              <a:rPr lang="fr-FR" dirty="0" smtClean="0"/>
+              <a:t>si </a:t>
+            </a:r>
+            <a:r>
+              <a:rPr lang="fr-FR" dirty="0" err="1" smtClean="0"/>
+              <a:t>capteurInfrarouge</a:t>
+            </a:r>
+            <a:r>
+              <a:rPr lang="fr-FR" dirty="0" smtClean="0"/>
+              <a:t>::obstacle() retourne 1(pour dire qu’il y a un cube ), on stop le robot</a:t>
+            </a:r>
+          </a:p>
+          <a:p>
+            <a:r>
+              <a:rPr lang="fr-FR" dirty="0" smtClean="0"/>
+              <a:t>Corriger trajectoire</a:t>
+            </a:r>
+          </a:p>
+          <a:p>
+            <a:pPr lvl="1"/>
+            <a:r>
+              <a:rPr lang="fr-FR" dirty="0" smtClean="0"/>
+              <a:t>Lecture de valeurs de </a:t>
+            </a:r>
+            <a:r>
+              <a:rPr lang="fr-FR" dirty="0" err="1" smtClean="0"/>
+              <a:t>capteurLuxAir</a:t>
+            </a:r>
+            <a:r>
+              <a:rPr lang="fr-FR" dirty="0" smtClean="0"/>
+              <a:t>::</a:t>
+            </a:r>
+            <a:r>
+              <a:rPr lang="fr-FR" dirty="0" err="1" smtClean="0"/>
+              <a:t>railGauche</a:t>
+            </a:r>
+            <a:r>
+              <a:rPr lang="fr-FR" dirty="0" smtClean="0"/>
+              <a:t>() et </a:t>
+            </a:r>
+            <a:r>
+              <a:rPr lang="fr-FR" dirty="0" err="1" smtClean="0"/>
+              <a:t>capteurLuxAir</a:t>
+            </a:r>
+            <a:r>
+              <a:rPr lang="fr-FR" dirty="0" smtClean="0"/>
+              <a:t>::</a:t>
+            </a:r>
+            <a:r>
+              <a:rPr lang="fr-FR" dirty="0" err="1" smtClean="0"/>
+              <a:t>railDroite</a:t>
+            </a:r>
+            <a:r>
+              <a:rPr lang="fr-FR" dirty="0" smtClean="0"/>
+              <a:t>()</a:t>
+            </a:r>
+          </a:p>
+          <a:p>
+            <a:pPr lvl="1"/>
+            <a:r>
+              <a:rPr lang="fr-FR" dirty="0" smtClean="0"/>
+              <a:t>Corriger en continue avec </a:t>
+            </a:r>
+            <a:r>
+              <a:rPr lang="fr-FR" dirty="0" err="1" smtClean="0"/>
+              <a:t>chassis</a:t>
+            </a:r>
+            <a:r>
+              <a:rPr lang="fr-FR" dirty="0" smtClean="0"/>
+              <a:t>::tourner()</a:t>
+            </a:r>
+          </a:p>
+          <a:p>
+            <a:pPr lvl="1"/>
+            <a:r>
+              <a:rPr lang="fr-FR" dirty="0" smtClean="0"/>
+              <a:t>Si ne détecte plus la ligne, s’arrête et tourne en rond</a:t>
+            </a:r>
+          </a:p>
+          <a:p>
+            <a:r>
+              <a:rPr lang="fr-FR" dirty="0" smtClean="0"/>
+              <a:t>Point d’arrivée</a:t>
+            </a:r>
+          </a:p>
+          <a:p>
+            <a:pPr lvl="1"/>
+            <a:r>
+              <a:rPr lang="fr-FR" dirty="0" smtClean="0"/>
+              <a:t>Si distance parcourue est suffisante avec variable de </a:t>
+            </a:r>
+            <a:r>
+              <a:rPr lang="fr-FR" dirty="0" err="1" smtClean="0"/>
+              <a:t>chassis</a:t>
+            </a:r>
+            <a:r>
+              <a:rPr lang="fr-FR" dirty="0" smtClean="0"/>
+              <a:t>::</a:t>
+            </a:r>
+            <a:r>
+              <a:rPr lang="fr-FR" dirty="0" err="1" smtClean="0"/>
+              <a:t>distanceResteAParcourue</a:t>
+            </a:r>
+            <a:endParaRPr lang="fr-FR" dirty="0" smtClean="0"/>
+          </a:p>
+          <a:p>
+            <a:pPr lvl="1"/>
+            <a:r>
+              <a:rPr lang="fr-FR" dirty="0" smtClean="0"/>
+              <a:t>Lecture de </a:t>
+            </a:r>
+            <a:r>
+              <a:rPr lang="fr-FR" dirty="0" err="1" smtClean="0"/>
+              <a:t>capteurLuxSol</a:t>
+            </a:r>
+            <a:r>
+              <a:rPr lang="fr-FR" dirty="0" smtClean="0"/>
+              <a:t>:: </a:t>
+            </a:r>
+            <a:r>
+              <a:rPr lang="fr-FR" dirty="0" err="1" smtClean="0"/>
+              <a:t>zoneBlancheGauche</a:t>
+            </a:r>
+            <a:r>
+              <a:rPr lang="fr-FR" dirty="0" smtClean="0"/>
+              <a:t>() et </a:t>
+            </a:r>
+            <a:r>
+              <a:rPr lang="fr-FR" dirty="0" err="1" smtClean="0"/>
+              <a:t>capteurLuxSol</a:t>
+            </a:r>
+            <a:r>
+              <a:rPr lang="fr-FR" dirty="0" smtClean="0"/>
+              <a:t> ::</a:t>
+            </a:r>
+            <a:r>
+              <a:rPr lang="fr-FR" dirty="0" err="1" smtClean="0"/>
+              <a:t>zoneBlancheDroite</a:t>
+            </a:r>
+            <a:r>
+              <a:rPr lang="fr-FR" dirty="0" smtClean="0"/>
+              <a:t>() pour tourner avec </a:t>
+            </a:r>
+            <a:r>
+              <a:rPr lang="fr-FR" dirty="0" err="1" smtClean="0"/>
+              <a:t>chassis</a:t>
+            </a:r>
+            <a:r>
+              <a:rPr lang="fr-FR" dirty="0" smtClean="0"/>
+              <a:t>:: tourner(</a:t>
+            </a:r>
+            <a:r>
+              <a:rPr lang="fr-FR" dirty="0" err="1" smtClean="0"/>
+              <a:t>signed</a:t>
+            </a:r>
+            <a:r>
+              <a:rPr lang="fr-FR" dirty="0" smtClean="0"/>
+              <a:t> </a:t>
+            </a:r>
+            <a:r>
+              <a:rPr lang="fr-FR" dirty="0" err="1" smtClean="0"/>
+              <a:t>int</a:t>
+            </a:r>
+            <a:r>
+              <a:rPr lang="fr-FR" dirty="0" smtClean="0"/>
+              <a:t> correction )</a:t>
+            </a:r>
+            <a:endParaRPr lang="en-US" dirty="0" smtClean="0"/>
+          </a:p>
+          <a:p>
+            <a:endParaRPr lang="fr-FR" dirty="0" smtClean="0"/>
+          </a:p>
+          <a:p>
+            <a:endParaRPr lang="en-US" dirty="0"/>
+          </a:p>
+        </p:txBody>
+      </p:sp>
+    </p:spTree>
+    <p:extLst>
+      <p:ext uri="{BB962C8B-B14F-4D97-AF65-F5344CB8AC3E}">
+        <p14:creationId xmlns:p14="http://schemas.microsoft.com/office/powerpoint/2010/main" val="709235114"/>
+      </p:ext>
+    </p:extLst>
+  </p:cSld>
+  <p:clrMapOvr>
+    <a:masterClrMapping/>
+  </p:clrMapOvr>
+  <p:timing>
+    <p:tnLst>
+      <p:par>
+        <p:cTn id="1" dur="indefinite" restart="never" nodeType="tmRoot"/>
+      </p:par>
+    </p:tnLst>
+  </p:timing>
+</p:sld>
+</file>
+
+<file path=ppt/slides/slide11.xml><?xml version="1.0" encoding="utf-8"?>
+<p:sld xmlns:a="http://schemas.openxmlformats.org/drawingml/2006/main" xmlns:r="http://schemas.openxmlformats.org/officeDocument/2006/relationships" xmlns:p="http://schemas.openxmlformats.org/presentationml/2006/main">
+  <p:cSld>
+    <p:spTree>
+      <p:nvGrpSpPr>
+        <p:cNvPr id="1" name=""/>
+        <p:cNvGrpSpPr/>
+        <p:nvPr/>
+      </p:nvGrpSpPr>
+      <p:grpSpPr>
+        <a:xfrm>
+          <a:off x="0" y="0"/>
+          <a:ext cx="0" cy="0"/>
+          <a:chOff x="0" y="0"/>
+          <a:chExt cx="0" cy="0"/>
+        </a:xfrm>
+      </p:grpSpPr>
+      <p:sp>
+        <p:nvSpPr>
+          <p:cNvPr id="2" name="Titre 1"/>
+          <p:cNvSpPr>
+            <a:spLocks noGrp="1"/>
+          </p:cNvSpPr>
+          <p:nvPr>
+            <p:ph type="title"/>
+          </p:nvPr>
+        </p:nvSpPr>
+        <p:spPr/>
+        <p:txBody>
+          <a:bodyPr/>
+          <a:lstStyle/>
+          <a:p>
+            <a:r>
               <a:rPr lang="fr-FR" dirty="0" smtClean="0"/>
               <a:t>Outils de travail</a:t>
             </a:r>
@@ -3205,6 +3480,13 @@
   <p:clrMapOvr>
     <a:masterClrMapping/>
   </p:clrMapOvr>
+  <p:timing>
+    <p:tnLst>
+      <p:par>
+        <p:cTn id="1" dur="indefinite" restart="never" nodeType="tmRoot"/>
+      </p:par>
+    </p:tnLst>
+  </p:timing>
 </p:sld>
 </file>
 
@@ -3261,7 +3543,7 @@
         <p:spPr/>
         <p:txBody>
           <a:bodyPr>
-            <a:normAutofit/>
+            <a:normAutofit lnSpcReduction="10000"/>
           </a:bodyPr>
           <a:lstStyle/>
           <a:p>
@@ -3275,6 +3557,17 @@
               <a:rPr lang="en-US" dirty="0" smtClean="0"/>
               <a:t>Libraries</a:t>
             </a:r>
+          </a:p>
+          <a:p>
+            <a:r>
+              <a:rPr lang="fr-FR" dirty="0" smtClean="0"/>
+              <a:t>Fonctions de </a:t>
+            </a:r>
+            <a:r>
+              <a:rPr lang="fr-FR" dirty="0" err="1" smtClean="0"/>
+              <a:t>utils.c</a:t>
+            </a:r>
+            <a:endParaRPr lang="en-US" dirty="0" smtClean="0"/>
           </a:p>
           <a:p>
             <a:r>
@@ -3348,6 +3641,13 @@
   <p:clrMapOvr>
     <a:masterClrMapping/>
   </p:clrMapOvr>
+  <p:timing>
+    <p:tnLst>
+      <p:par>
+        <p:cTn id="1" dur="indefinite" restart="never" nodeType="tmRoot"/>
+      </p:par>
+    </p:tnLst>
+  </p:timing>
 </p:sld>
 </file>
 
@@ -3401,7 +3701,12 @@
             <p:ph idx="1"/>
           </p:nvPr>
         </p:nvSpPr>
-        <p:spPr/>
+        <p:spPr>
+          <a:xfrm>
+            <a:off x="838200" y="1825625"/>
+            <a:ext cx="10515600" cy="4679084"/>
+          </a:xfrm>
+        </p:spPr>
         <p:txBody>
           <a:bodyPr>
             <a:normAutofit fontScale="70000" lnSpcReduction="20000"/>
@@ -3437,13 +3742,8 @@
             <a:pPr lvl="1"/>
             <a:r>
               <a:rPr lang="fr-FR" dirty="0" smtClean="0"/>
-              <a:t>2 roues au sol P1.1 (gauche), </a:t>
-            </a:r>
-            <a:r>
-              <a:rPr lang="fr-FR" dirty="0" smtClean="0"/>
-              <a:t>P1.2(droite)</a:t>
-            </a:r>
-            <a:endParaRPr lang="fr-FR" dirty="0" smtClean="0"/>
+              <a:t>2 roues au sol P1.1 (gauche), P1.2(droite)</a:t>
+            </a:r>
           </a:p>
           <a:p>
             <a:pPr lvl="2"/>
@@ -3460,9 +3760,20 @@
             </a:r>
             <a:r>
               <a:rPr lang="fr-FR" dirty="0" smtClean="0"/>
-              <a:t>P1.3 (gauche), P1.4 (droite)</a:t>
-            </a:r>
-            <a:endParaRPr lang="fr-FR" dirty="0" smtClean="0"/>
+              <a:t>P1.4 </a:t>
+            </a:r>
+            <a:r>
+              <a:rPr lang="fr-FR" dirty="0" smtClean="0"/>
+              <a:t>(gauche), </a:t>
+            </a:r>
+            <a:r>
+              <a:rPr lang="fr-FR" dirty="0" smtClean="0"/>
+              <a:t>P1.7 </a:t>
+            </a:r>
+            <a:r>
+              <a:rPr lang="fr-FR" dirty="0" smtClean="0"/>
+              <a:t>(droite)</a:t>
+            </a:r>
           </a:p>
           <a:p>
             <a:pPr lvl="2"/>
@@ -3482,13 +3793,8 @@
             <a:pPr lvl="1"/>
             <a:r>
               <a:rPr lang="fr-FR" dirty="0" smtClean="0"/>
-              <a:t>1 devant </a:t>
-            </a:r>
-            <a:r>
-              <a:rPr lang="fr-FR" dirty="0" smtClean="0"/>
-              <a:t>P1.5</a:t>
-            </a:r>
-            <a:endParaRPr lang="fr-FR" dirty="0" smtClean="0"/>
+              <a:t>1 devant P1.5</a:t>
+            </a:r>
           </a:p>
           <a:p>
             <a:pPr lvl="2"/>
@@ -3515,11 +3821,7 @@
             <a:pPr lvl="1"/>
             <a:r>
               <a:rPr lang="fr-FR" dirty="0" smtClean="0"/>
-              <a:t>Roue A P2.0 et Roue B </a:t>
-            </a:r>
-            <a:r>
-              <a:rPr lang="fr-FR" dirty="0" smtClean="0"/>
-              <a:t>P2.3 </a:t>
+              <a:t>Roue A P2.0 et Roue B P2.3 </a:t>
             </a:r>
           </a:p>
           <a:p>
@@ -3565,14 +3867,41 @@
             </a:r>
             <a:r>
               <a:rPr lang="fr-FR" dirty="0" smtClean="0"/>
-              <a:t> ?</a:t>
-            </a:r>
-          </a:p>
-          <a:p>
-            <a:pPr lvl="1"/>
-            <a:r>
-              <a:rPr lang="fr-FR" dirty="0" smtClean="0"/>
-              <a:t>Tous P1.1-P1.5</a:t>
+              <a:t> </a:t>
+            </a:r>
+            <a:r>
+              <a:rPr lang="fr-FR" dirty="0" smtClean="0"/>
+              <a:t>?</a:t>
+            </a:r>
+          </a:p>
+          <a:p>
+            <a:pPr lvl="1"/>
+            <a:r>
+              <a:rPr lang="fr-FR" dirty="0" smtClean="0">
+                <a:solidFill>
+                  <a:srgbClr val="FF0000"/>
+                </a:solidFill>
+              </a:rPr>
+              <a:t>Entrée possibles : P1.1 P1.2 P1.4 P1.5 P1.7</a:t>
+            </a:r>
+          </a:p>
+          <a:p>
+            <a:pPr lvl="1"/>
+            <a:r>
+              <a:rPr lang="fr-FR" dirty="0" smtClean="0"/>
+              <a:t>Tous </a:t>
+            </a:r>
+            <a:r>
+              <a:rPr lang="fr-FR" dirty="0" smtClean="0"/>
+              <a:t>P1.1-P1.5 P1.3 bouton </a:t>
+            </a:r>
+            <a:r>
+              <a:rPr lang="fr-FR" dirty="0"/>
+              <a:t>de </a:t>
+            </a:r>
+            <a:r>
+              <a:rPr lang="fr-FR" dirty="0" smtClean="0"/>
+              <a:t>P1.0 et P1.6 non plus</a:t>
             </a:r>
           </a:p>
           <a:p>
@@ -3911,6 +4240,13 @@
   <p:clrMapOvr>
     <a:masterClrMapping/>
   </p:clrMapOvr>
+  <p:timing>
+    <p:tnLst>
+      <p:par>
+        <p:cTn id="1" dur="indefinite" restart="never" nodeType="tmRoot"/>
+      </p:par>
+    </p:tnLst>
+  </p:timing>
 </p:sld>
 </file>
 
@@ -3967,7 +4303,7 @@
         <p:spPr/>
         <p:txBody>
           <a:bodyPr>
-            <a:normAutofit/>
+            <a:normAutofit lnSpcReduction="10000"/>
           </a:bodyPr>
           <a:lstStyle/>
           <a:p>
@@ -3986,7 +4322,23 @@
           <a:p>
             <a:r>
               <a:rPr lang="fr-FR" dirty="0" err="1" smtClean="0"/>
+              <a:t>Chassis</a:t>
+            </a:r>
+            <a:endParaRPr lang="fr-FR" dirty="0" smtClean="0"/>
+          </a:p>
+          <a:p>
+            <a:pPr lvl="1"/>
+            <a:r>
+              <a:rPr lang="fr-FR" dirty="0" err="1" smtClean="0"/>
               <a:t>chassis.c</a:t>
+            </a:r>
+            <a:endParaRPr lang="fr-FR" dirty="0" smtClean="0"/>
+          </a:p>
+          <a:p>
+            <a:pPr lvl="1"/>
+            <a:r>
+              <a:rPr lang="fr-FR" dirty="0" err="1" smtClean="0"/>
+              <a:t>PID.c</a:t>
             </a:r>
             <a:endParaRPr lang="fr-FR" dirty="0" smtClean="0"/>
           </a:p>
@@ -4005,11 +4357,7 @@
             <a:pPr lvl="1"/>
             <a:r>
               <a:rPr lang="fr-FR" dirty="0" err="1" smtClean="0"/>
-              <a:t>capteurInfrarouge</a:t>
-            </a:r>
-            <a:r>
-              <a:rPr lang="fr-FR" dirty="0" err="1" smtClean="0"/>
-              <a:t>.c</a:t>
+              <a:t>capteurInfrarouge.c</a:t>
             </a:r>
             <a:endParaRPr lang="fr-FR" dirty="0" smtClean="0"/>
           </a:p>
@@ -4017,11 +4365,7 @@
             <a:pPr lvl="1"/>
             <a:r>
               <a:rPr lang="fr-FR" dirty="0" err="1" smtClean="0"/>
-              <a:t>capteurLuxSol</a:t>
-            </a:r>
-            <a:r>
-              <a:rPr lang="fr-FR" dirty="0" err="1" smtClean="0"/>
-              <a:t>.c</a:t>
+              <a:t>capteurLigne.c</a:t>
             </a:r>
             <a:endParaRPr lang="fr-FR" dirty="0" smtClean="0"/>
           </a:p>
@@ -4029,11 +4373,7 @@
             <a:pPr lvl="1"/>
             <a:r>
               <a:rPr lang="fr-FR" dirty="0" err="1" smtClean="0"/>
-              <a:t>capteurLuxAir</a:t>
-            </a:r>
-            <a:r>
-              <a:rPr lang="fr-FR" dirty="0" err="1" smtClean="0"/>
-              <a:t>.c</a:t>
+              <a:t>capteurLuxAir.c</a:t>
             </a:r>
             <a:endParaRPr lang="fr-FR" dirty="0" smtClean="0"/>
           </a:p>
@@ -4064,6 +4404,13 @@
   <p:clrMapOvr>
     <a:masterClrMapping/>
   </p:clrMapOvr>
+  <p:timing>
+    <p:tnLst>
+      <p:par>
+        <p:cTn id="1" dur="indefinite" restart="never" nodeType="tmRoot"/>
+      </p:par>
+    </p:tnLst>
+  </p:timing>
 </p:sld>
 </file>
 
@@ -4100,12 +4447,16 @@
           <a:lstStyle/>
           <a:p>
             <a:r>
-              <a:rPr lang="fr-FR" dirty="0" smtClean="0"/>
-              <a:t>Fonctions de </a:t>
-            </a:r>
-            <a:r>
-              <a:rPr lang="fr-FR" dirty="0" err="1" smtClean="0"/>
-              <a:t>chassis.c</a:t>
+              <a:rPr lang="en-US" dirty="0" err="1"/>
+              <a:t>Fonctions</a:t>
+            </a:r>
+            <a:r>
+              <a:rPr lang="en-US" dirty="0"/>
+              <a:t> de </a:t>
+            </a:r>
+            <a:r>
+              <a:rPr lang="en-US" dirty="0" err="1" smtClean="0"/>
+              <a:t>utils.c</a:t>
             </a:r>
             <a:endParaRPr lang="en-US" dirty="0"/>
           </a:p>
@@ -4121,42 +4472,14 @@
             <p:ph idx="1"/>
           </p:nvPr>
         </p:nvSpPr>
-        <p:spPr>
-          <a:xfrm>
-            <a:off x="838200" y="1475508"/>
-            <a:ext cx="10515600" cy="5081155"/>
-          </a:xfrm>
-        </p:spPr>
-        <p:txBody>
-          <a:bodyPr>
-            <a:normAutofit fontScale="62500" lnSpcReduction="20000"/>
-          </a:bodyPr>
-          <a:lstStyle/>
-          <a:p>
-            <a:r>
-              <a:rPr lang="fr-FR" dirty="0" err="1" smtClean="0"/>
-              <a:t>initChassis</a:t>
-            </a:r>
-            <a:r>
-              <a:rPr lang="fr-FR" dirty="0" smtClean="0"/>
-              <a:t>()</a:t>
-            </a:r>
-          </a:p>
-          <a:p>
-            <a:pPr lvl="1"/>
-            <a:r>
-              <a:rPr lang="fr-FR" dirty="0" smtClean="0"/>
-              <a:t>Initialiser les moteurs les capteurs odomètres</a:t>
-            </a:r>
-          </a:p>
-          <a:p>
-            <a:r>
-              <a:rPr lang="fr-FR" dirty="0" err="1"/>
-              <a:t>a</a:t>
-            </a:r>
-            <a:r>
-              <a:rPr lang="fr-FR" dirty="0" err="1" smtClean="0"/>
-              <a:t>vancerVitesse</a:t>
+        <p:spPr/>
+        <p:txBody>
+          <a:bodyPr/>
+          <a:lstStyle/>
+          <a:p>
+            <a:r>
+              <a:rPr lang="fr-FR" dirty="0" err="1" smtClean="0"/>
+              <a:t>initEntree</a:t>
             </a:r>
             <a:r>
               <a:rPr lang="fr-FR" dirty="0" smtClean="0"/>
@@ -4168,35 +4491,7 @@
             </a:r>
             <a:r>
               <a:rPr lang="fr-FR" dirty="0" smtClean="0"/>
-              <a:t> vitesse)</a:t>
-            </a:r>
-          </a:p>
-          <a:p>
-            <a:pPr lvl="1"/>
-            <a:r>
-              <a:rPr lang="fr-FR" dirty="0" smtClean="0"/>
-              <a:t>Change le rapport cyclique</a:t>
-            </a:r>
-          </a:p>
-          <a:p>
-            <a:pPr lvl="1"/>
-            <a:r>
-              <a:rPr lang="fr-FR" dirty="0" smtClean="0"/>
-              <a:t>Interruption si obstacle() retourne 1</a:t>
-            </a:r>
-            <a:endParaRPr lang="fr-FR" dirty="0" smtClean="0"/>
-          </a:p>
-          <a:p>
-            <a:pPr lvl="1"/>
-            <a:r>
-              <a:rPr lang="fr-FR" dirty="0" smtClean="0"/>
-              <a:t>PID</a:t>
-            </a:r>
-          </a:p>
-          <a:p>
-            <a:r>
-              <a:rPr lang="fr-FR" dirty="0" smtClean="0"/>
-              <a:t>avancer(</a:t>
+              <a:t> port, </a:t>
             </a:r>
             <a:r>
               <a:rPr lang="fr-FR" dirty="0" err="1" smtClean="0"/>
@@ -4204,7 +4499,17 @@
             </a:r>
             <a:r>
               <a:rPr lang="fr-FR" dirty="0" smtClean="0"/>
-              <a:t> vitesse, </a:t>
+              <a:t> bit)</a:t>
+            </a:r>
+          </a:p>
+          <a:p>
+            <a:r>
+              <a:rPr lang="fr-FR" dirty="0" err="1" smtClean="0"/>
+              <a:t>initSortie</a:t>
+            </a:r>
+            <a:r>
+              <a:rPr lang="fr-FR" dirty="0" smtClean="0"/>
+              <a:t>(</a:t>
             </a:r>
             <a:r>
               <a:rPr lang="fr-FR" dirty="0" err="1" smtClean="0"/>
@@ -4212,70 +4517,7 @@
             </a:r>
             <a:r>
               <a:rPr lang="fr-FR" dirty="0" smtClean="0"/>
-              <a:t> distance</a:t>
-            </a:r>
-            <a:r>
-              <a:rPr lang="fr-FR" dirty="0" smtClean="0"/>
-              <a:t>)</a:t>
-            </a:r>
-          </a:p>
-          <a:p>
-            <a:pPr lvl="1"/>
-            <a:r>
-              <a:rPr lang="fr-FR" dirty="0" smtClean="0"/>
-              <a:t>Mettre les moteurs en routes</a:t>
-            </a:r>
-          </a:p>
-          <a:p>
-            <a:pPr lvl="1"/>
-            <a:r>
-              <a:rPr lang="fr-FR" dirty="0" smtClean="0"/>
-              <a:t>Initialise les compteurs au début</a:t>
-            </a:r>
-          </a:p>
-          <a:p>
-            <a:pPr lvl="1"/>
-            <a:r>
-              <a:rPr lang="fr-FR" dirty="0" smtClean="0"/>
-              <a:t>PID</a:t>
-            </a:r>
-          </a:p>
-          <a:p>
-            <a:pPr lvl="1"/>
-            <a:r>
-              <a:rPr lang="fr-FR" dirty="0" smtClean="0"/>
-              <a:t>Change le rapport cyclique par rapport à vitesse</a:t>
-            </a:r>
-          </a:p>
-          <a:p>
-            <a:pPr lvl="1"/>
-            <a:r>
-              <a:rPr lang="fr-FR" dirty="0" smtClean="0"/>
-              <a:t>(Interruption dans le main)</a:t>
-            </a:r>
-          </a:p>
-          <a:p>
-            <a:r>
-              <a:rPr lang="fr-FR" dirty="0" err="1" smtClean="0"/>
-              <a:t>arreter</a:t>
-            </a:r>
-            <a:r>
-              <a:rPr lang="fr-FR" dirty="0" smtClean="0"/>
-              <a:t>()</a:t>
-            </a:r>
-          </a:p>
-          <a:p>
-            <a:r>
-              <a:rPr lang="fr-FR" dirty="0" smtClean="0"/>
-              <a:t>tourner( </a:t>
-            </a:r>
-            <a:r>
-              <a:rPr lang="fr-FR" dirty="0" err="1" smtClean="0"/>
-              <a:t>signed</a:t>
-            </a:r>
-            <a:r>
-              <a:rPr lang="fr-FR" dirty="0" smtClean="0"/>
-              <a:t> </a:t>
+              <a:t> port, </a:t>
             </a:r>
             <a:r>
               <a:rPr lang="fr-FR" dirty="0" err="1" smtClean="0"/>
@@ -4283,83 +4525,29 @@
             </a:r>
             <a:r>
               <a:rPr lang="fr-FR" dirty="0" smtClean="0"/>
-              <a:t> correction)</a:t>
-            </a:r>
-          </a:p>
-          <a:p>
-            <a:pPr lvl="1"/>
-            <a:r>
-              <a:rPr lang="fr-FR" dirty="0" smtClean="0"/>
-              <a:t>127 correspond sur tourner sur place vers droite</a:t>
-            </a:r>
-          </a:p>
-          <a:p>
-            <a:pPr lvl="1"/>
-            <a:r>
-              <a:rPr lang="fr-FR" dirty="0" smtClean="0"/>
-              <a:t>Tourne vers gauche si correction est négative</a:t>
-            </a:r>
-          </a:p>
-          <a:p>
-            <a:pPr lvl="1"/>
-            <a:r>
-              <a:rPr lang="fr-FR" dirty="0" smtClean="0"/>
-              <a:t>Tourne vers droite si correction est positive</a:t>
-            </a:r>
-          </a:p>
-          <a:p>
-            <a:pPr lvl="1"/>
-            <a:r>
-              <a:rPr lang="fr-FR" dirty="0" smtClean="0"/>
-              <a:t>Avancer une roue plus vite que l’autre (PID)</a:t>
-            </a:r>
-          </a:p>
-          <a:p>
-            <a:r>
-              <a:rPr lang="fr-FR" dirty="0" smtClean="0"/>
-              <a:t>Variable globale : </a:t>
-            </a:r>
-            <a:r>
-              <a:rPr lang="fr-FR" dirty="0" err="1" smtClean="0"/>
-              <a:t>d</a:t>
-            </a:r>
-            <a:r>
-              <a:rPr lang="fr-FR" dirty="0" err="1" smtClean="0"/>
-              <a:t>istanceReste</a:t>
-            </a:r>
-            <a:r>
-              <a:rPr lang="fr-FR" dirty="0" err="1" smtClean="0"/>
-              <a:t>APa</a:t>
-            </a:r>
-            <a:r>
-              <a:rPr lang="fr-FR" dirty="0" err="1" smtClean="0"/>
-              <a:t>rcourue</a:t>
-            </a:r>
-            <a:endParaRPr lang="fr-FR" dirty="0" smtClean="0"/>
-          </a:p>
-          <a:p>
-            <a:pPr lvl="1"/>
-            <a:r>
-              <a:rPr lang="fr-FR" dirty="0" smtClean="0"/>
-              <a:t>Pour savoir si on est arrivée à la fin</a:t>
-            </a:r>
-            <a:endParaRPr lang="fr-FR" dirty="0" smtClean="0"/>
-          </a:p>
-          <a:p>
-            <a:endParaRPr lang="fr-FR" dirty="0" smtClean="0"/>
+              <a:t> bit)</a:t>
+            </a:r>
+            <a:endParaRPr lang="en-US" dirty="0"/>
           </a:p>
         </p:txBody>
       </p:sp>
     </p:spTree>
     <p:extLst>
       <p:ext uri="{BB962C8B-B14F-4D97-AF65-F5344CB8AC3E}">
-        <p14:creationId xmlns:p14="http://schemas.microsoft.com/office/powerpoint/2010/main" val="2601501847"/>
+        <p14:creationId xmlns:p14="http://schemas.microsoft.com/office/powerpoint/2010/main" val="3699516957"/>
       </p:ext>
     </p:extLst>
   </p:cSld>
   <p:clrMapOvr>
     <a:masterClrMapping/>
   </p:clrMapOvr>
+  <p:timing>
+    <p:tnLst>
+      <p:par>
+        <p:cTn id="1" dur="indefinite" restart="never" nodeType="tmRoot"/>
+      </p:par>
+    </p:tnLst>
+  </p:timing>
 </p:sld>
 </file>
 
@@ -4401,7 +4589,7 @@
             </a:r>
             <a:r>
               <a:rPr lang="fr-FR" dirty="0" err="1" smtClean="0"/>
-              <a:t>capteurInfrarouge.c</a:t>
+              <a:t>chassis.c</a:t>
             </a:r>
             <a:endParaRPr lang="en-US" dirty="0"/>
           </a:p>
@@ -4417,18 +4605,21 @@
             <p:ph idx="1"/>
           </p:nvPr>
         </p:nvSpPr>
-        <p:spPr/>
-        <p:txBody>
-          <a:bodyPr/>
-          <a:lstStyle/>
-          <a:p>
-            <a:r>
-              <a:rPr lang="fr-FR" dirty="0" err="1" smtClean="0"/>
-              <a:t>init</a:t>
-            </a:r>
-            <a:r>
-              <a:rPr lang="fr-FR" dirty="0" err="1" smtClean="0"/>
-              <a:t>Infrarouge</a:t>
+        <p:spPr>
+          <a:xfrm>
+            <a:off x="838200" y="1475508"/>
+            <a:ext cx="10515600" cy="5081155"/>
+          </a:xfrm>
+        </p:spPr>
+        <p:txBody>
+          <a:bodyPr>
+            <a:normAutofit fontScale="40000" lnSpcReduction="20000"/>
+          </a:bodyPr>
+          <a:lstStyle/>
+          <a:p>
+            <a:r>
+              <a:rPr lang="fr-FR" dirty="0" err="1" smtClean="0"/>
+              <a:t>initChassis</a:t>
             </a:r>
             <a:r>
               <a:rPr lang="fr-FR" dirty="0" smtClean="0"/>
@@ -4436,45 +4627,277 @@
             </a:r>
           </a:p>
           <a:p>
+            <a:pPr lvl="1"/>
+            <a:r>
+              <a:rPr lang="fr-FR" dirty="0" smtClean="0"/>
+              <a:t>Initialiser les moteurs les capteurs odomètres</a:t>
+            </a:r>
+          </a:p>
+          <a:p>
+            <a:pPr lvl="1"/>
+            <a:r>
+              <a:rPr lang="fr-FR" dirty="0" smtClean="0"/>
+              <a:t>P2.2 moteur A gauche P2.4 moteur B droite</a:t>
+            </a:r>
+          </a:p>
+          <a:p>
+            <a:pPr lvl="1"/>
+            <a:r>
+              <a:rPr lang="fr-FR" dirty="0" smtClean="0"/>
+              <a:t>P2.1 sens du moteur A P2.5 sens du moteur B</a:t>
+            </a:r>
+          </a:p>
+          <a:p>
+            <a:r>
+              <a:rPr lang="fr-FR" dirty="0" err="1"/>
+              <a:t>a</a:t>
+            </a:r>
+            <a:r>
+              <a:rPr lang="fr-FR" dirty="0" err="1" smtClean="0"/>
+              <a:t>vancerVitesse</a:t>
+            </a:r>
+            <a:r>
+              <a:rPr lang="fr-FR" dirty="0" smtClean="0"/>
+              <a:t>(</a:t>
+            </a:r>
+            <a:r>
+              <a:rPr lang="fr-FR" dirty="0" err="1" smtClean="0"/>
+              <a:t>int</a:t>
+            </a:r>
+            <a:r>
+              <a:rPr lang="fr-FR" dirty="0" smtClean="0"/>
+              <a:t> vitesse)</a:t>
+            </a:r>
+          </a:p>
+          <a:p>
+            <a:pPr lvl="1"/>
+            <a:r>
+              <a:rPr lang="fr-FR" dirty="0" smtClean="0"/>
+              <a:t>Change le rapport cyclique</a:t>
+            </a:r>
+          </a:p>
+          <a:p>
+            <a:pPr lvl="1"/>
+            <a:r>
+              <a:rPr lang="fr-FR" dirty="0" smtClean="0"/>
+              <a:t>Interruption si obstacle() retourne 1</a:t>
+            </a:r>
+          </a:p>
+          <a:p>
+            <a:pPr lvl="1"/>
+            <a:r>
+              <a:rPr lang="fr-FR" dirty="0" smtClean="0"/>
+              <a:t>PID</a:t>
+            </a:r>
+          </a:p>
+          <a:p>
+            <a:r>
+              <a:rPr lang="fr-FR" dirty="0" smtClean="0"/>
+              <a:t>avancer(</a:t>
+            </a:r>
+            <a:r>
+              <a:rPr lang="fr-FR" dirty="0" err="1" smtClean="0"/>
+              <a:t>int</a:t>
+            </a:r>
+            <a:r>
+              <a:rPr lang="fr-FR" dirty="0" smtClean="0"/>
+              <a:t> vitesse, </a:t>
+            </a:r>
+            <a:r>
+              <a:rPr lang="fr-FR" dirty="0" err="1" smtClean="0"/>
+              <a:t>int</a:t>
+            </a:r>
+            <a:r>
+              <a:rPr lang="fr-FR" dirty="0" smtClean="0"/>
+              <a:t> distance)</a:t>
+            </a:r>
+          </a:p>
+          <a:p>
+            <a:pPr lvl="1"/>
+            <a:r>
+              <a:rPr lang="fr-FR" dirty="0" smtClean="0"/>
+              <a:t>Mettre les moteurs en routes</a:t>
+            </a:r>
+          </a:p>
+          <a:p>
+            <a:pPr lvl="1"/>
+            <a:r>
+              <a:rPr lang="fr-FR" dirty="0" smtClean="0"/>
+              <a:t>Initialise les compteurs au début</a:t>
+            </a:r>
+          </a:p>
+          <a:p>
+            <a:pPr lvl="1"/>
+            <a:r>
+              <a:rPr lang="fr-FR" dirty="0" smtClean="0"/>
+              <a:t>PID</a:t>
+            </a:r>
+          </a:p>
+          <a:p>
+            <a:pPr lvl="1"/>
+            <a:r>
+              <a:rPr lang="fr-FR" dirty="0" smtClean="0"/>
+              <a:t>Change le rapport cyclique par rapport à vitesse</a:t>
+            </a:r>
+          </a:p>
+          <a:p>
+            <a:pPr lvl="1"/>
+            <a:r>
+              <a:rPr lang="fr-FR" dirty="0" smtClean="0"/>
+              <a:t>(Interruption dans le main)</a:t>
+            </a:r>
+          </a:p>
+          <a:p>
+            <a:r>
+              <a:rPr lang="fr-FR" dirty="0" err="1" smtClean="0"/>
+              <a:t>arreter</a:t>
+            </a:r>
+            <a:r>
+              <a:rPr lang="fr-FR" dirty="0" smtClean="0"/>
+              <a:t>()</a:t>
+            </a:r>
+          </a:p>
+          <a:p>
+            <a:r>
+              <a:rPr lang="fr-FR" dirty="0" smtClean="0"/>
+              <a:t>tourner( </a:t>
+            </a:r>
+            <a:r>
+              <a:rPr lang="fr-FR" dirty="0" err="1" smtClean="0"/>
+              <a:t>signed</a:t>
+            </a:r>
+            <a:r>
+              <a:rPr lang="fr-FR" dirty="0" smtClean="0"/>
+              <a:t> </a:t>
+            </a:r>
+            <a:r>
+              <a:rPr lang="fr-FR" dirty="0" err="1" smtClean="0"/>
+              <a:t>int</a:t>
+            </a:r>
+            <a:r>
+              <a:rPr lang="fr-FR" dirty="0" smtClean="0"/>
+              <a:t> correction)</a:t>
+            </a:r>
+          </a:p>
+          <a:p>
+            <a:pPr lvl="1"/>
+            <a:r>
+              <a:rPr lang="fr-FR" dirty="0" smtClean="0"/>
+              <a:t>Tourne </a:t>
+            </a:r>
+            <a:r>
+              <a:rPr lang="fr-FR" dirty="0" smtClean="0"/>
+              <a:t>vers gauche si correction est négative</a:t>
+            </a:r>
+          </a:p>
+          <a:p>
+            <a:pPr lvl="1"/>
+            <a:r>
+              <a:rPr lang="fr-FR" dirty="0" smtClean="0"/>
+              <a:t>Tourne vers droite si correction est positive</a:t>
+            </a:r>
+          </a:p>
+          <a:p>
+            <a:pPr lvl="1"/>
+            <a:r>
+              <a:rPr lang="fr-FR" dirty="0" smtClean="0"/>
+              <a:t>Avancer une roue plus vite que l’autre (PID</a:t>
+            </a:r>
+            <a:r>
+              <a:rPr lang="fr-FR" dirty="0" smtClean="0"/>
+              <a:t>)</a:t>
+            </a:r>
+          </a:p>
+          <a:p>
+            <a:r>
+              <a:rPr lang="fr-FR" dirty="0" smtClean="0"/>
+              <a:t>Tourner angle (</a:t>
+            </a:r>
+            <a:r>
+              <a:rPr lang="fr-FR" dirty="0" err="1" smtClean="0"/>
+              <a:t>signed</a:t>
+            </a:r>
+            <a:r>
+              <a:rPr lang="fr-FR" dirty="0" smtClean="0"/>
+              <a:t>  </a:t>
+            </a:r>
+            <a:r>
+              <a:rPr lang="fr-FR" dirty="0" err="1" smtClean="0"/>
+              <a:t>int</a:t>
+            </a:r>
+            <a:r>
+              <a:rPr lang="fr-FR" dirty="0" smtClean="0"/>
+              <a:t> angle)</a:t>
+            </a:r>
+          </a:p>
+          <a:p>
+            <a:pPr lvl="1"/>
             <a:r>
               <a:rPr lang="fr-FR" dirty="0"/>
-              <a:t>o</a:t>
-            </a:r>
-            <a:r>
-              <a:rPr lang="fr-FR" dirty="0" smtClean="0"/>
-              <a:t>bstacle() : </a:t>
-            </a:r>
-          </a:p>
-          <a:p>
-            <a:pPr lvl="1"/>
-            <a:r>
-              <a:rPr lang="fr-FR" dirty="0"/>
-              <a:t>R</a:t>
-            </a:r>
-            <a:r>
-              <a:rPr lang="fr-FR" dirty="0" smtClean="0"/>
-              <a:t>eturn 1 obstacle, distance inférieure à 15 cm?</a:t>
-            </a:r>
-          </a:p>
-          <a:p>
-            <a:pPr lvl="1"/>
-            <a:r>
-              <a:rPr lang="fr-FR" dirty="0" smtClean="0"/>
-              <a:t>Return 0 rien</a:t>
-            </a:r>
+              <a:t>127 correspond sur tourner sur place vers </a:t>
+            </a:r>
+            <a:r>
+              <a:rPr lang="fr-FR" dirty="0" smtClean="0"/>
+              <a:t>droite</a:t>
+            </a:r>
+            <a:endParaRPr lang="fr-FR" dirty="0" smtClean="0"/>
+          </a:p>
+          <a:p>
+            <a:r>
+              <a:rPr lang="fr-FR" dirty="0" smtClean="0"/>
+              <a:t>Variable globale : </a:t>
+            </a:r>
+          </a:p>
+          <a:p>
+            <a:pPr lvl="1"/>
+            <a:r>
+              <a:rPr lang="fr-FR" dirty="0" err="1" smtClean="0"/>
+              <a:t>distanceResteAParcourue</a:t>
+            </a:r>
+            <a:endParaRPr lang="fr-FR" dirty="0" smtClean="0"/>
+          </a:p>
+          <a:p>
+            <a:pPr lvl="2"/>
+            <a:r>
+              <a:rPr lang="fr-FR" dirty="0" smtClean="0"/>
+              <a:t>Pour savoir si on est arrivée à la fin</a:t>
+            </a:r>
+          </a:p>
+          <a:p>
+            <a:pPr lvl="1"/>
+            <a:r>
+              <a:rPr lang="fr-FR" dirty="0" err="1" smtClean="0"/>
+              <a:t>Cmpt_a</a:t>
+            </a:r>
+            <a:endParaRPr lang="fr-FR" dirty="0"/>
+          </a:p>
+          <a:p>
+            <a:pPr lvl="1"/>
+            <a:r>
+              <a:rPr lang="fr-FR" dirty="0" err="1" smtClean="0"/>
+              <a:t>Cmpt_b</a:t>
+            </a:r>
+            <a:endParaRPr lang="fr-FR" dirty="0" smtClean="0"/>
           </a:p>
         </p:txBody>
       </p:sp>
     </p:spTree>
     <p:extLst>
       <p:ext uri="{BB962C8B-B14F-4D97-AF65-F5344CB8AC3E}">
-        <p14:creationId xmlns:p14="http://schemas.microsoft.com/office/powerpoint/2010/main" val="1443379604"/>
+        <p14:creationId xmlns:p14="http://schemas.microsoft.com/office/powerpoint/2010/main" val="2601501847"/>
       </p:ext>
     </p:extLst>
   </p:cSld>
   <p:clrMapOvr>
     <a:masterClrMapping/>
   </p:clrMapOvr>
+  <p:timing>
+    <p:tnLst>
+      <p:par>
+        <p:cTn id="1" dur="indefinite" restart="never" nodeType="tmRoot"/>
+      </p:par>
+    </p:tnLst>
+  </p:timing>
 </p:sld>
 </file>
 
@@ -4516,7 +4939,7 @@
             </a:r>
             <a:r>
               <a:rPr lang="fr-FR" dirty="0" err="1" smtClean="0"/>
-              <a:t>capteurLuxSol.c</a:t>
+              <a:t>capteurInfrarouge.c</a:t>
             </a:r>
             <a:endParaRPr lang="en-US" dirty="0"/>
           </a:p>
@@ -4539,7 +4962,7 @@
           <a:p>
             <a:r>
               <a:rPr lang="fr-FR" dirty="0" err="1" smtClean="0"/>
-              <a:t>initLuxSol</a:t>
+              <a:t>initInfrarouge</a:t>
             </a:r>
             <a:r>
               <a:rPr lang="fr-FR" dirty="0" smtClean="0"/>
@@ -4548,62 +4971,51 @@
           </a:p>
           <a:p>
             <a:r>
-              <a:rPr lang="fr-FR" dirty="0" err="1" smtClean="0"/>
-              <a:t>zoneBlancheGauche</a:t>
-            </a:r>
-            <a:r>
-              <a:rPr lang="fr-FR" dirty="0" smtClean="0"/>
-              <a:t>()</a:t>
-            </a:r>
-          </a:p>
-          <a:p>
-            <a:pPr lvl="1"/>
-            <a:r>
-              <a:rPr lang="fr-FR" dirty="0" smtClean="0"/>
-              <a:t>Return 1 si le capteur gauche (la roue gauche) est dans le zone blanche de la fin</a:t>
-            </a:r>
-          </a:p>
-          <a:p>
-            <a:r>
-              <a:rPr lang="fr-FR" dirty="0" err="1" smtClean="0"/>
-              <a:t>zoneBlancheDroite</a:t>
-            </a:r>
-            <a:r>
-              <a:rPr lang="fr-FR" dirty="0" smtClean="0"/>
-              <a:t>()</a:t>
-            </a:r>
-          </a:p>
-          <a:p>
-            <a:pPr lvl="1"/>
-            <a:r>
-              <a:rPr lang="fr-FR" dirty="0" smtClean="0"/>
-              <a:t>Return 1 si le capteur droite (la roue droite) est dans le zone blanche de la fin</a:t>
-            </a:r>
-          </a:p>
-          <a:p>
-            <a:pPr marL="0" indent="0">
-              <a:buNone/>
-            </a:pPr>
-            <a:endParaRPr lang="fr-FR" dirty="0" smtClean="0"/>
-          </a:p>
-          <a:p>
-            <a:endParaRPr lang="fr-FR" dirty="0" smtClean="0"/>
-          </a:p>
-          <a:p>
-            <a:endParaRPr lang="en-US" dirty="0"/>
+              <a:rPr lang="fr-FR" dirty="0"/>
+              <a:t>o</a:t>
+            </a:r>
+            <a:r>
+              <a:rPr lang="fr-FR" dirty="0" smtClean="0"/>
+              <a:t>bstacle() : </a:t>
+            </a:r>
+          </a:p>
+          <a:p>
+            <a:pPr lvl="1"/>
+            <a:r>
+              <a:rPr lang="fr-FR" dirty="0"/>
+              <a:t>R</a:t>
+            </a:r>
+            <a:r>
+              <a:rPr lang="fr-FR" dirty="0" smtClean="0"/>
+              <a:t>eturn 1 obstacle, distance inférieure à 15 cm?</a:t>
+            </a:r>
+          </a:p>
+          <a:p>
+            <a:pPr lvl="1"/>
+            <a:r>
+              <a:rPr lang="fr-FR" dirty="0" smtClean="0"/>
+              <a:t>Return 0 rien</a:t>
+            </a:r>
           </a:p>
         </p:txBody>
       </p:sp>
     </p:spTree>
     <p:extLst>
       <p:ext uri="{BB962C8B-B14F-4D97-AF65-F5344CB8AC3E}">
-        <p14:creationId xmlns:p14="http://schemas.microsoft.com/office/powerpoint/2010/main" val="1625018573"/>
+        <p14:creationId xmlns:p14="http://schemas.microsoft.com/office/powerpoint/2010/main" val="1443379604"/>
       </p:ext>
     </p:extLst>
   </p:cSld>
   <p:clrMapOvr>
     <a:masterClrMapping/>
   </p:clrMapOvr>
+  <p:timing>
+    <p:tnLst>
+      <p:par>
+        <p:cTn id="1" dur="indefinite" restart="never" nodeType="tmRoot"/>
+      </p:par>
+    </p:tnLst>
+  </p:timing>
 </p:sld>
 </file>
 
@@ -4645,7 +5057,7 @@
             </a:r>
             <a:r>
               <a:rPr lang="fr-FR" dirty="0" err="1" smtClean="0"/>
-              <a:t>capteurLuxAir.c</a:t>
+              <a:t>capteurLigne.c</a:t>
             </a:r>
             <a:endParaRPr lang="en-US" dirty="0"/>
           </a:p>
@@ -4668,17 +5080,18 @@
           <a:p>
             <a:r>
               <a:rPr lang="fr-FR" dirty="0" err="1" smtClean="0"/>
-              <a:t>initLuxAir</a:t>
+              <a:t>initCaptLigne</a:t>
             </a:r>
             <a:r>
               <a:rPr lang="fr-FR" dirty="0" smtClean="0"/>
               <a:t>()</a:t>
             </a:r>
-          </a:p>
-          <a:p>
-            <a:r>
-              <a:rPr lang="fr-FR" dirty="0" err="1" smtClean="0"/>
-              <a:t>railGauche</a:t>
+            <a:endParaRPr lang="fr-FR" dirty="0" smtClean="0"/>
+          </a:p>
+          <a:p>
+            <a:r>
+              <a:rPr lang="fr-FR" dirty="0" err="1" smtClean="0"/>
+              <a:t>zoneBlancheGauche</a:t>
             </a:r>
             <a:r>
               <a:rPr lang="fr-FR" dirty="0" smtClean="0"/>
@@ -4689,17 +5102,13 @@
             <a:pPr lvl="1"/>
             <a:r>
               <a:rPr lang="fr-FR" dirty="0" smtClean="0"/>
-              <a:t>Return la valeur de capteur </a:t>
-            </a:r>
-          </a:p>
-          <a:p>
-            <a:r>
-              <a:rPr lang="fr-FR" dirty="0" err="1" smtClean="0"/>
-              <a:t>rail</a:t>
-            </a:r>
-            <a:r>
-              <a:rPr lang="fr-FR" dirty="0" err="1" smtClean="0"/>
-              <a:t>Droite</a:t>
+              <a:t>Return 1 si le capteur gauche (la roue gauche) est dans le zone blanche de la fin</a:t>
+            </a:r>
+          </a:p>
+          <a:p>
+            <a:r>
+              <a:rPr lang="fr-FR" dirty="0" err="1" smtClean="0"/>
+              <a:t>zoneBlancheDroite</a:t>
             </a:r>
             <a:r>
               <a:rPr lang="fr-FR" dirty="0" smtClean="0"/>
@@ -4710,21 +5119,19 @@
             <a:pPr lvl="1"/>
             <a:r>
               <a:rPr lang="fr-FR" dirty="0" smtClean="0"/>
-              <a:t>Return la valeur de capteur</a:t>
-            </a:r>
-          </a:p>
-          <a:p>
-            <a:r>
-              <a:rPr lang="fr-FR" dirty="0" smtClean="0"/>
-              <a:t>Attention:</a:t>
-            </a:r>
-          </a:p>
-          <a:p>
-            <a:pPr lvl="1"/>
-            <a:r>
-              <a:rPr lang="fr-FR" dirty="0" smtClean="0"/>
-              <a:t>Bande lumineuse largeur : 1cm, hauteur : 10cm </a:t>
-            </a:r>
+              <a:t>Return 1 si le capteur droite (la roue droite) est dans le zone blanche de la fin</a:t>
+            </a:r>
+          </a:p>
+          <a:p>
+            <a:pPr marL="0" indent="0">
+              <a:buNone/>
+            </a:pPr>
+            <a:endParaRPr lang="fr-FR" dirty="0" smtClean="0"/>
+          </a:p>
+          <a:p>
+            <a:endParaRPr lang="fr-FR" dirty="0" smtClean="0"/>
+          </a:p>
+          <a:p>
             <a:endParaRPr lang="en-US" dirty="0"/>
           </a:p>
         </p:txBody>
@@ -4732,13 +5139,20 @@
     </p:spTree>
     <p:extLst>
       <p:ext uri="{BB962C8B-B14F-4D97-AF65-F5344CB8AC3E}">
-        <p14:creationId xmlns:p14="http://schemas.microsoft.com/office/powerpoint/2010/main" val="3592723864"/>
+        <p14:creationId xmlns:p14="http://schemas.microsoft.com/office/powerpoint/2010/main" val="1625018573"/>
       </p:ext>
     </p:extLst>
   </p:cSld>
   <p:clrMapOvr>
     <a:masterClrMapping/>
   </p:clrMapOvr>
+  <p:timing>
+    <p:tnLst>
+      <p:par>
+        <p:cTn id="1" dur="indefinite" restart="never" nodeType="tmRoot"/>
+      </p:par>
+    </p:tnLst>
+  </p:timing>
 </p:sld>
 </file>
 
@@ -4775,8 +5189,12 @@
           <a:lstStyle/>
           <a:p>
             <a:r>
-              <a:rPr lang="fr-FR" dirty="0" err="1" smtClean="0"/>
-              <a:t>main.c</a:t>
+              <a:rPr lang="fr-FR" dirty="0" smtClean="0"/>
+              <a:t>Fonctions de </a:t>
+            </a:r>
+            <a:r>
+              <a:rPr lang="fr-FR" dirty="0" err="1" smtClean="0"/>
+              <a:t>capteurLuxAir.c</a:t>
             </a:r>
             <a:endParaRPr lang="en-US" dirty="0"/>
           </a:p>
@@ -4794,67 +5212,36 @@
         </p:nvSpPr>
         <p:spPr/>
         <p:txBody>
-          <a:bodyPr>
-            <a:normAutofit fontScale="92500" lnSpcReduction="10000"/>
-          </a:bodyPr>
-          <a:lstStyle/>
-          <a:p>
-            <a:r>
-              <a:rPr lang="fr-FR" dirty="0" smtClean="0"/>
-              <a:t>Détecter l’obstacle </a:t>
-            </a:r>
-          </a:p>
-          <a:p>
-            <a:pPr lvl="1"/>
-            <a:r>
-              <a:rPr lang="fr-FR" dirty="0" smtClean="0"/>
-              <a:t>si </a:t>
-            </a:r>
-            <a:r>
-              <a:rPr lang="fr-FR" dirty="0" err="1" smtClean="0"/>
-              <a:t>capteurInfrarouge</a:t>
-            </a:r>
-            <a:r>
-              <a:rPr lang="fr-FR" dirty="0" smtClean="0"/>
-              <a:t>::obstacle() retourne 1(pour dire qu’il y a un cube ), on stop le robot</a:t>
-            </a:r>
-          </a:p>
-          <a:p>
-            <a:r>
-              <a:rPr lang="fr-FR" dirty="0" smtClean="0"/>
-              <a:t>Corriger trajectoire</a:t>
-            </a:r>
-          </a:p>
-          <a:p>
-            <a:pPr lvl="1"/>
-            <a:r>
-              <a:rPr lang="fr-FR" dirty="0" smtClean="0"/>
-              <a:t>Lecture de valeurs de </a:t>
-            </a:r>
-            <a:r>
-              <a:rPr lang="fr-FR" dirty="0" err="1" smtClean="0"/>
-              <a:t>capteurLuxAir</a:t>
-            </a:r>
-            <a:r>
-              <a:rPr lang="fr-FR" dirty="0" smtClean="0"/>
-              <a:t>::</a:t>
-            </a:r>
+          <a:bodyPr/>
+          <a:lstStyle/>
+          <a:p>
+            <a:r>
+              <a:rPr lang="fr-FR" dirty="0" err="1" smtClean="0"/>
+              <a:t>initLuxAir</a:t>
+            </a:r>
+            <a:r>
+              <a:rPr lang="fr-FR" dirty="0" smtClean="0"/>
+              <a:t>()</a:t>
+            </a:r>
+          </a:p>
+          <a:p>
             <a:r>
               <a:rPr lang="fr-FR" dirty="0" err="1" smtClean="0"/>
               <a:t>railGauche</a:t>
             </a:r>
             <a:r>
               <a:rPr lang="fr-FR" dirty="0" smtClean="0"/>
-              <a:t>() et </a:t>
-            </a:r>
-            <a:r>
-              <a:rPr lang="fr-FR" dirty="0" err="1" smtClean="0"/>
-              <a:t>capteurLuxAir</a:t>
-            </a:r>
-            <a:r>
-              <a:rPr lang="fr-FR" dirty="0" smtClean="0"/>
-              <a:t>::</a:t>
-            </a:r>
+              <a:t>()</a:t>
+            </a:r>
+          </a:p>
+          <a:p>
+            <a:pPr lvl="1"/>
+            <a:r>
+              <a:rPr lang="fr-FR" dirty="0" smtClean="0"/>
+              <a:t>Return la valeur de capteur </a:t>
+            </a:r>
+          </a:p>
+          <a:p>
             <a:r>
               <a:rPr lang="fr-FR" dirty="0" err="1" smtClean="0"/>
               <a:t>railDroite</a:t>
@@ -4863,128 +5250,49 @@
               <a:rPr lang="fr-FR" dirty="0" smtClean="0"/>
               <a:t>()</a:t>
             </a:r>
+          </a:p>
+          <a:p>
+            <a:pPr lvl="1"/>
+            <a:r>
+              <a:rPr lang="fr-FR" dirty="0" smtClean="0"/>
+              <a:t>Return la valeur de capteur</a:t>
+            </a:r>
+          </a:p>
+          <a:p>
+            <a:r>
+              <a:rPr lang="fr-FR" dirty="0" smtClean="0"/>
+              <a:t>Attention:</a:t>
+            </a:r>
+          </a:p>
+          <a:p>
+            <a:pPr lvl="1"/>
+            <a:r>
+              <a:rPr lang="fr-FR" dirty="0" smtClean="0"/>
+              <a:t>Bande lumineuse largeur : 1cm, hauteur : 10cm </a:t>
+            </a:r>
+          </a:p>
+          <a:p>
+            <a:pPr lvl="1"/>
+            <a:r>
+              <a:rPr lang="fr-FR" dirty="0" smtClean="0"/>
+              <a:t>À l’hauteur de la table environ 2,3 k</a:t>
+            </a:r>
+            <a:r>
+              <a:rPr lang="el-GR" dirty="0" smtClean="0"/>
+              <a:t>Ω</a:t>
+            </a:r>
             <a:endParaRPr lang="fr-FR" dirty="0" smtClean="0"/>
           </a:p>
           <a:p>
             <a:pPr lvl="1"/>
             <a:r>
               <a:rPr lang="fr-FR" dirty="0" smtClean="0"/>
-              <a:t>Corriger en continue avec </a:t>
-            </a:r>
-            <a:r>
-              <a:rPr lang="fr-FR" dirty="0" err="1" smtClean="0"/>
-              <a:t>chassis</a:t>
-            </a:r>
-            <a:r>
-              <a:rPr lang="fr-FR" dirty="0" smtClean="0"/>
-              <a:t>::tourner()</a:t>
-            </a:r>
-          </a:p>
-          <a:p>
-            <a:pPr lvl="1"/>
-            <a:r>
-              <a:rPr lang="fr-FR" dirty="0" smtClean="0"/>
-              <a:t>Si ne détecte plus la ligne, s’arrête et tourne en rond</a:t>
-            </a:r>
-          </a:p>
-          <a:p>
-            <a:r>
-              <a:rPr lang="fr-FR" dirty="0" smtClean="0"/>
-              <a:t>Point d’arrivée</a:t>
-            </a:r>
-          </a:p>
-          <a:p>
-            <a:pPr lvl="1"/>
-            <a:r>
-              <a:rPr lang="fr-FR" dirty="0" smtClean="0"/>
-              <a:t>Si distance parcourue est suffisante avec </a:t>
-            </a:r>
-            <a:r>
-              <a:rPr lang="fr-FR" dirty="0" smtClean="0"/>
-              <a:t>variable de </a:t>
-            </a:r>
-            <a:r>
-              <a:rPr lang="fr-FR" dirty="0" err="1" smtClean="0"/>
-              <a:t>chassis</a:t>
-            </a:r>
-            <a:r>
-              <a:rPr lang="fr-FR" dirty="0" smtClean="0"/>
-              <a:t>::</a:t>
-            </a:r>
-            <a:r>
-              <a:rPr lang="fr-FR" dirty="0" err="1" smtClean="0"/>
-              <a:t>distanceResteAParcourue</a:t>
-            </a:r>
-            <a:endParaRPr lang="fr-FR" dirty="0" smtClean="0"/>
-          </a:p>
-          <a:p>
-            <a:pPr lvl="1"/>
-            <a:r>
-              <a:rPr lang="fr-FR" dirty="0" smtClean="0"/>
-              <a:t>Lecture de </a:t>
-            </a:r>
-            <a:r>
-              <a:rPr lang="fr-FR" dirty="0" err="1" smtClean="0"/>
-              <a:t>capteurLuxSol</a:t>
-            </a:r>
-            <a:r>
-              <a:rPr lang="fr-FR" dirty="0" smtClean="0"/>
-              <a:t>:: </a:t>
-            </a:r>
-            <a:r>
-              <a:rPr lang="fr-FR" dirty="0" err="1" smtClean="0"/>
-              <a:t>zoneBlancheGauche</a:t>
-            </a:r>
-            <a:r>
-              <a:rPr lang="fr-FR" dirty="0" smtClean="0"/>
-              <a:t>() et </a:t>
-            </a:r>
-            <a:r>
-              <a:rPr lang="fr-FR" dirty="0" err="1" smtClean="0"/>
-              <a:t>capteurLuxSol</a:t>
-            </a:r>
-            <a:r>
-              <a:rPr lang="fr-FR" dirty="0" smtClean="0"/>
-              <a:t> ::</a:t>
-            </a:r>
-            <a:r>
-              <a:rPr lang="fr-FR" dirty="0" err="1" smtClean="0"/>
-              <a:t>zoneBlancheDroite</a:t>
-            </a:r>
-            <a:r>
-              <a:rPr lang="fr-FR" dirty="0" smtClean="0"/>
-              <a:t>() pour tourner avec </a:t>
-            </a:r>
-            <a:r>
-              <a:rPr lang="fr-FR" dirty="0" err="1" smtClean="0"/>
-              <a:t>chassis</a:t>
-            </a:r>
-            <a:r>
-              <a:rPr lang="fr-FR" dirty="0" smtClean="0"/>
-              <a:t>:: tourner(</a:t>
-            </a:r>
-            <a:r>
-              <a:rPr lang="fr-FR" dirty="0" err="1" smtClean="0"/>
-              <a:t>signed</a:t>
-            </a:r>
-            <a:r>
-              <a:rPr lang="fr-FR" dirty="0" smtClean="0"/>
-              <a:t> </a:t>
-            </a:r>
-            <a:r>
-              <a:rPr lang="fr-FR" dirty="0" err="1" smtClean="0"/>
-              <a:t>int</a:t>
-            </a:r>
-            <a:r>
-              <a:rPr lang="fr-FR" dirty="0" smtClean="0"/>
-              <a:t> correction )</a:t>
-            </a:r>
-            <a:endParaRPr lang="en-US" dirty="0" smtClean="0"/>
-          </a:p>
-          <a:p>
-            <a:endParaRPr lang="fr-FR" dirty="0" smtClean="0"/>
-          </a:p>
-          <a:p>
+              <a:t>Proche de néon 500</a:t>
+            </a:r>
+            <a:r>
+              <a:rPr lang="el-GR" dirty="0" smtClean="0"/>
+              <a:t>Ω</a:t>
+            </a:r>
             <a:endParaRPr lang="en-US" dirty="0"/>
           </a:p>
         </p:txBody>
@@ -4992,13 +5300,20 @@
     </p:spTree>
     <p:extLst>
       <p:ext uri="{BB962C8B-B14F-4D97-AF65-F5344CB8AC3E}">
-        <p14:creationId xmlns:p14="http://schemas.microsoft.com/office/powerpoint/2010/main" val="709235114"/>
+        <p14:creationId xmlns:p14="http://schemas.microsoft.com/office/powerpoint/2010/main" val="3592723864"/>
       </p:ext>
     </p:extLst>
   </p:cSld>
   <p:clrMapOvr>
     <a:masterClrMapping/>
   </p:clrMapOvr>
+  <p:timing>
+    <p:tnLst>
+      <p:par>
+        <p:cTn id="1" dur="indefinite" restart="never" nodeType="tmRoot"/>
+      </p:par>
+    </p:tnLst>
+  </p:timing>
 </p:sld>
 </file>
 

</xml_diff>